<commit_message>
adding images in creating textual representation
</commit_message>
<xml_diff>
--- a/Presentation.pptx
+++ b/Presentation.pptx
@@ -18370,9 +18370,7 @@
             <a:avLst/>
           </a:prstGeom>
           <a:solidFill>
-            <a:schemeClr val="accent1">
-              <a:lumMod val="50000"/>
-            </a:schemeClr>
+            <a:schemeClr val="bg1"/>
           </a:solidFill>
         </p:spPr>
         <p:style>
@@ -18396,7 +18394,11 @@
           <a:lstStyle/>
           <a:p>
             <a:pPr algn="ctr"/>
-            <a:endParaRPr lang="en-US"/>
+            <a:endParaRPr lang="en-US">
+              <a:solidFill>
+                <a:schemeClr val="bg1"/>
+              </a:solidFill>
+            </a:endParaRPr>
           </a:p>
         </p:txBody>
       </p:sp>
@@ -18414,16 +18416,14 @@
         </p:nvSpPr>
         <p:spPr>
           <a:xfrm>
-            <a:off x="4666890" y="380640"/>
+            <a:off x="4666890" y="396635"/>
             <a:ext cx="1319841" cy="1233579"/>
           </a:xfrm>
           <a:prstGeom prst="flowChartConnector">
             <a:avLst/>
           </a:prstGeom>
           <a:solidFill>
-            <a:schemeClr val="accent1">
-              <a:lumMod val="50000"/>
-            </a:schemeClr>
+            <a:schemeClr val="bg1"/>
           </a:solidFill>
         </p:spPr>
         <p:style>
@@ -18523,9 +18523,7 @@
             <a:avLst/>
           </a:prstGeom>
           <a:solidFill>
-            <a:schemeClr val="accent1">
-              <a:lumMod val="50000"/>
-            </a:schemeClr>
+            <a:schemeClr val="bg1"/>
           </a:solidFill>
         </p:spPr>
         <p:style>
@@ -18564,12 +18562,20 @@
                   </a:ext>
                 </a:extLst>
               </p:cNvPr>
-              <p:cNvGraphicFramePr/>
-              <p:nvPr/>
+              <p:cNvGraphicFramePr>
+                <a:graphicFrameLocks noChangeAspect="1"/>
+              </p:cNvGraphicFramePr>
+              <p:nvPr>
+                <p:extLst>
+                  <p:ext uri="{D42A27DB-BD31-4B8C-83A1-F6EECF244321}">
+                    <p14:modId xmlns:p14="http://schemas.microsoft.com/office/powerpoint/2010/main" val="1530065359"/>
+                  </p:ext>
+                </p:extLst>
+              </p:nvPr>
             </p:nvGraphicFramePr>
             <p:xfrm>
-              <a:off x="1058158" y="1769495"/>
-              <a:ext cx="3608732" cy="2936281"/>
+              <a:off x="1407290" y="1772890"/>
+              <a:ext cx="2910467" cy="2929490"/>
             </p:xfrm>
             <a:graphic>
               <a:graphicData uri="http://schemas.microsoft.com/office/drawing/2017/model3d">
@@ -18577,7 +18583,7 @@
                   <am3d:spPr>
                     <a:xfrm>
                       <a:off x="0" y="0"/>
-                      <a:ext cx="3608732" cy="2936281"/>
+                      <a:ext cx="2910467" cy="2929490"/>
                     </a:xfrm>
                     <a:prstGeom prst="rect">
                       <a:avLst/>
@@ -18597,13 +18603,13 @@
                       <am3d:sy n="1000000" d="1000000"/>
                       <am3d:sz n="1000000" d="1000000"/>
                     </am3d:scale>
-                    <am3d:rot/>
+                    <am3d:rot ax="-473361" ay="190195" az="-26341"/>
                     <am3d:postTrans dx="0" dy="0" dz="0"/>
                   </am3d:trans>
                   <am3d:raster rName="Office3DRenderer" rVer="16.0.8326">
                     <am3d:blip r:embed="rId3"/>
                   </am3d:raster>
-                  <am3d:objViewport viewportSz="5193187"/>
+                  <am3d:objViewport viewportSz="5193186"/>
                   <am3d:ambientLight>
                     <am3d:clr>
                       <a:scrgbClr r="50000" g="50000" b="50000"/>
@@ -18659,8 +18665,8 @@
             </p:blipFill>
             <p:spPr>
               <a:xfrm>
-                <a:off x="1058158" y="1769495"/>
-                <a:ext cx="3608732" cy="2936281"/>
+                <a:off x="1407290" y="1772890"/>
+                <a:ext cx="2910467" cy="2929490"/>
               </a:xfrm>
               <a:prstGeom prst="rect">
                 <a:avLst/>
@@ -18705,6 +18711,78 @@
           </a:p>
         </p:txBody>
       </p:sp>
+      <p:pic>
+        <p:nvPicPr>
+          <p:cNvPr id="6" name="Graphic 5" descr="Images with solid fill">
+            <a:extLst>
+              <a:ext uri="{FF2B5EF4-FFF2-40B4-BE49-F238E27FC236}">
+                <a16:creationId xmlns:a16="http://schemas.microsoft.com/office/drawing/2014/main" id="{49ADBDD7-0C4C-1C06-A167-C03EE2B26CD4}"/>
+              </a:ext>
+            </a:extLst>
+          </p:cNvPr>
+          <p:cNvPicPr>
+            <a:picLocks noChangeAspect="1"/>
+          </p:cNvPicPr>
+          <p:nvPr/>
+        </p:nvPicPr>
+        <p:blipFill>
+          <a:blip r:embed="rId4">
+            <a:extLst>
+              <a:ext uri="{96DAC541-7B7A-43D3-8B79-37D633B846F1}">
+                <asvg:svgBlip xmlns:asvg="http://schemas.microsoft.com/office/drawing/2016/SVG/main" r:embed="rId5"/>
+              </a:ext>
+            </a:extLst>
+          </a:blip>
+          <a:stretch>
+            <a:fillRect/>
+          </a:stretch>
+        </p:blipFill>
+        <p:spPr>
+          <a:xfrm>
+            <a:off x="4869610" y="556224"/>
+            <a:ext cx="914400" cy="914400"/>
+          </a:xfrm>
+          <a:prstGeom prst="rect">
+            <a:avLst/>
+          </a:prstGeom>
+        </p:spPr>
+      </p:pic>
+      <p:pic>
+        <p:nvPicPr>
+          <p:cNvPr id="9" name="Graphic 8" descr="Chat bubble outline">
+            <a:extLst>
+              <a:ext uri="{FF2B5EF4-FFF2-40B4-BE49-F238E27FC236}">
+                <a16:creationId xmlns:a16="http://schemas.microsoft.com/office/drawing/2014/main" id="{57A3E31F-677A-C4EE-EAC5-9E393EA3F414}"/>
+              </a:ext>
+            </a:extLst>
+          </p:cNvPr>
+          <p:cNvPicPr>
+            <a:picLocks noChangeAspect="1"/>
+          </p:cNvPicPr>
+          <p:nvPr/>
+        </p:nvPicPr>
+        <p:blipFill>
+          <a:blip r:embed="rId6">
+            <a:extLst>
+              <a:ext uri="{96DAC541-7B7A-43D3-8B79-37D633B846F1}">
+                <asvg:svgBlip xmlns:asvg="http://schemas.microsoft.com/office/drawing/2016/SVG/main" r:embed="rId7"/>
+              </a:ext>
+            </a:extLst>
+          </a:blip>
+          <a:stretch>
+            <a:fillRect/>
+          </a:stretch>
+        </p:blipFill>
+        <p:spPr>
+          <a:xfrm>
+            <a:off x="5830530" y="2173407"/>
+            <a:ext cx="914400" cy="914400"/>
+          </a:xfrm>
+          <a:prstGeom prst="rect">
+            <a:avLst/>
+          </a:prstGeom>
+        </p:spPr>
+      </p:pic>
     </p:spTree>
     <p:extLst>
       <p:ext uri="{BB962C8B-B14F-4D97-AF65-F5344CB8AC3E}">

</xml_diff>